<commit_message>
changed preseantation and tested some minor fixes
</commit_message>
<xml_diff>
--- a/4_Presentation/Praesentation_Bakery_Sales_Prediction_Grruppe_14.pptx
+++ b/4_Presentation/Praesentation_Bakery_Sales_Prediction_Grruppe_14.pptx
@@ -115,6 +115,11 @@
       </a:defRPr>
     </a:lvl9pPr>
   </p:defaultTextStyle>
+  <p:extLst>
+    <p:ext uri="{EFAFB233-063F-42B5-8137-9DF3F51BA10A}">
+      <p15:sldGuideLst xmlns:p15="http://schemas.microsoft.com/office/powerpoint/2012/main"/>
+    </p:ext>
+  </p:extLst>
 </p:presentation>
 </file>
 
@@ -5495,12 +5500,16 @@
           <a:lstStyle/>
           <a:p>
             <a:r>
+              <a:rPr lang="de-DE" dirty="0"/>
+              <a:t>„</a:t>
+            </a:r>
+            <a:r>
               <a:rPr lang="de-DE" dirty="0" err="1"/>
               <a:t>Worst</a:t>
             </a:r>
             <a:r>
               <a:rPr lang="de-DE" dirty="0"/>
-              <a:t> Fail</a:t>
+              <a:t> Fail“</a:t>
             </a:r>
           </a:p>
         </p:txBody>
@@ -5526,7 +5535,28 @@
           <a:bodyPr/>
           <a:lstStyle/>
           <a:p>
-            <a:endParaRPr lang="de-DE" sz="1500" dirty="0"/>
+            <a:r>
+              <a:rPr lang="de-DE" sz="1500" b="0" dirty="0"/>
+              <a:t>Wir hatten versucht einen Lag für den Umsatz in das Modell einzubinden, was auf den Trainingsdaten, schon mit der Regression sehr gute Ergebnisse erzeugt hat.</a:t>
+            </a:r>
+          </a:p>
+          <a:p>
+            <a:endParaRPr lang="de-DE" sz="1500" b="0" dirty="0"/>
+          </a:p>
+          <a:p>
+            <a:r>
+              <a:rPr lang="de-DE" sz="1500" b="0" dirty="0"/>
+              <a:t>Nur kann so natürlich keine Voraussage stattfinden, wenn wir keine Zeitreihenanalyse machen, da das Modell (Regression und unser neurales Netz) den Umsatz von vor einer Woche nicht miteinbeziehen kann, da unbekannt.</a:t>
+            </a:r>
+          </a:p>
+          <a:p>
+            <a:endParaRPr lang="de-DE" sz="1500" b="0" dirty="0"/>
+          </a:p>
+          <a:p>
+            <a:r>
+              <a:rPr lang="de-DE" sz="1500" b="0" dirty="0"/>
+              <a:t>Daraus ergibt sich die Überlegung bspw. auch ein anderes Modell für die Voraussage zu benutzen, wenn man es noch verbessern will.</a:t>
+            </a:r>
           </a:p>
         </p:txBody>
       </p:sp>

</xml_diff>